<commit_message>
added wrap up slide
</commit_message>
<xml_diff>
--- a/print/precal_11_5.pptx
+++ b/print/precal_11_5.pptx
@@ -21,6 +21,7 @@
     <p:sldId id="266" r:id="rId18"/>
     <p:sldId id="267" r:id="rId19"/>
     <p:sldId id="268" r:id="rId20"/>
+    <p:sldId id="269" r:id="rId21"/>
   </p:sldIdLst>
   <p:sldSz cx="9144000" cy="5143500"/>
   <p:notesSz cx="6858000" cy="9144000"/>
@@ -6384,6 +6385,387 @@
 </p:sld>
 </file>
 
+<file path=ppt/slides/slide14.xml><?xml version="1.0" encoding="utf-8"?>
+<p:sld xmlns:a="http://schemas.openxmlformats.org/drawingml/2006/main" xmlns:r="http://schemas.openxmlformats.org/officeDocument/2006/relationships" xmlns:p="http://schemas.openxmlformats.org/presentationml/2006/main" xmlns:m="http://schemas.openxmlformats.org/officeDocument/2006/math" xmlns:a14="http://schemas.microsoft.com/office/drawing/2010/main" showMasterSp="1" showMasterPhAnim="1">
+  <p:cSld>
+    <p:spTree>
+      <p:nvGrpSpPr>
+        <p:cNvPr id="1" name=""/>
+        <p:cNvGrpSpPr/>
+        <p:nvPr/>
+      </p:nvGrpSpPr>
+      <p:grpSpPr>
+        <a:xfrm>
+          <a:off x="0" y="0"/>
+          <a:ext cx="0" cy="0"/>
+          <a:chOff x="0" y="0"/>
+          <a:chExt cx="0" cy="0"/>
+        </a:xfrm>
+      </p:grpSpPr>
+      <p:sp>
+        <p:nvSpPr>
+          <p:cNvPr id="244" name="Double-click to edit"/>
+          <p:cNvSpPr txBox="1"/>
+          <p:nvPr>
+            <p:ph type="title"/>
+          </p:nvPr>
+        </p:nvSpPr>
+        <p:spPr>
+          <a:prstGeom prst="rect">
+            <a:avLst/>
+          </a:prstGeom>
+        </p:spPr>
+        <p:txBody>
+          <a:bodyPr lIns="91422" tIns="91422" rIns="91422" bIns="91422"/>
+          <a:lstStyle/>
+          <a:p>
+            <a:pPr defTabSz="886968">
+              <a:defRPr sz="2910"/>
+            </a:pPr>
+          </a:p>
+        </p:txBody>
+      </p:sp>
+      <p:sp>
+        <p:nvSpPr>
+          <p:cNvPr id="245" name="Google Shape;119;p19"/>
+          <p:cNvSpPr txBox="1"/>
+          <p:nvPr/>
+        </p:nvSpPr>
+        <p:spPr>
+          <a:xfrm>
+            <a:off x="2859032" y="1558863"/>
+            <a:ext cx="5404037" cy="2452970"/>
+          </a:xfrm>
+          <a:prstGeom prst="rect">
+            <a:avLst/>
+          </a:prstGeom>
+          <a:ln w="12700">
+            <a:miter lim="400000"/>
+          </a:ln>
+          <a:extLst>
+            <a:ext uri="{C572A759-6A51-4108-AA02-DFA0A04FC94B}">
+              <ma14:wrappingTextBoxFlag xmlns:ma14="http://schemas.microsoft.com/office/mac/drawingml/2011/main" val="1"/>
+            </a:ext>
+          </a:extLst>
+        </p:spPr>
+        <p:txBody>
+          <a:bodyPr lIns="243799" tIns="243799" rIns="243799" bIns="243799">
+            <a:normAutofit fontScale="100000" lnSpcReduction="0"/>
+          </a:bodyPr>
+          <a:lstStyle/>
+          <a:p>
+            <a:pPr marL="573034" indent="-573034" defTabSz="2218944">
+              <a:lnSpc>
+                <a:spcPct val="115000"/>
+              </a:lnSpc>
+              <a:buSzPct val="100000"/>
+              <a:buAutoNum type="arabicPeriod" startAt="1"/>
+              <a:defRPr sz="1638">
+                <a:solidFill>
+                  <a:srgbClr val="171717"/>
+                </a:solidFill>
+                <a:latin typeface="+mn-lt"/>
+                <a:ea typeface="+mn-ea"/>
+                <a:cs typeface="+mn-cs"/>
+                <a:sym typeface="Arial"/>
+              </a:defRPr>
+            </a:pPr>
+            <a:r>
+              <a:rPr u="sng"/>
+              <a:t>Separate</a:t>
+            </a:r>
+            <a:r>
+              <a:t> your desks!</a:t>
+            </a:r>
+          </a:p>
+          <a:p>
+            <a:pPr marL="573034" indent="-573034" defTabSz="2218944">
+              <a:lnSpc>
+                <a:spcPct val="115000"/>
+              </a:lnSpc>
+              <a:buSzPct val="100000"/>
+              <a:buAutoNum type="arabicPeriod" startAt="1"/>
+              <a:defRPr sz="1638">
+                <a:solidFill>
+                  <a:srgbClr val="171717"/>
+                </a:solidFill>
+                <a:latin typeface="+mn-lt"/>
+                <a:ea typeface="+mn-ea"/>
+                <a:cs typeface="+mn-cs"/>
+                <a:sym typeface="Arial"/>
+              </a:defRPr>
+            </a:pPr>
+            <a:r>
+              <a:t>Make sure you are logged out of your google on your computer! </a:t>
+            </a:r>
+          </a:p>
+          <a:p>
+            <a:pPr marL="573034" indent="-573034" defTabSz="2218944">
+              <a:lnSpc>
+                <a:spcPct val="115000"/>
+              </a:lnSpc>
+              <a:buSzPct val="100000"/>
+              <a:buAutoNum type="arabicPeriod" startAt="1"/>
+              <a:defRPr sz="1638">
+                <a:solidFill>
+                  <a:srgbClr val="171717"/>
+                </a:solidFill>
+                <a:latin typeface="+mn-lt"/>
+                <a:ea typeface="+mn-ea"/>
+                <a:cs typeface="+mn-cs"/>
+                <a:sym typeface="Arial"/>
+              </a:defRPr>
+            </a:pPr>
+            <a:r>
+              <a:t>Return your computer to the </a:t>
+            </a:r>
+            <a:r>
+              <a:rPr b="1"/>
+              <a:t>correct location in the cart</a:t>
+            </a:r>
+            <a:r>
+              <a:t>. </a:t>
+            </a:r>
+            <a:r>
+              <a:rPr b="1" u="sng"/>
+              <a:t>Plug your computer in!</a:t>
+            </a:r>
+          </a:p>
+          <a:p>
+            <a:pPr marL="573034" indent="-573034" defTabSz="2218944">
+              <a:lnSpc>
+                <a:spcPct val="115000"/>
+              </a:lnSpc>
+              <a:buSzPct val="100000"/>
+              <a:buAutoNum type="arabicPeriod" startAt="1"/>
+              <a:defRPr sz="1638">
+                <a:solidFill>
+                  <a:srgbClr val="171717"/>
+                </a:solidFill>
+                <a:latin typeface="+mn-lt"/>
+                <a:ea typeface="+mn-ea"/>
+                <a:cs typeface="+mn-cs"/>
+                <a:sym typeface="Arial"/>
+              </a:defRPr>
+            </a:pPr>
+            <a:r>
+              <a:t>Return to your seat. Remain there until the bell rings.</a:t>
+            </a:r>
+          </a:p>
+        </p:txBody>
+      </p:sp>
+      <p:grpSp>
+        <p:nvGrpSpPr>
+          <p:cNvPr id="248" name="Google Shape;118;p19"/>
+          <p:cNvGrpSpPr/>
+          <p:nvPr/>
+        </p:nvGrpSpPr>
+        <p:grpSpPr>
+          <a:xfrm>
+            <a:off x="2147095" y="500360"/>
+            <a:ext cx="6535195" cy="810605"/>
+            <a:chOff x="0" y="0"/>
+            <a:chExt cx="6535193" cy="810604"/>
+          </a:xfrm>
+        </p:grpSpPr>
+        <p:sp>
+          <p:nvSpPr>
+            <p:cNvPr id="246" name="Rectangle"/>
+            <p:cNvSpPr/>
+            <p:nvPr/>
+          </p:nvSpPr>
+          <p:spPr>
+            <a:xfrm>
+              <a:off x="-1" y="-1"/>
+              <a:ext cx="6535195" cy="810606"/>
+            </a:xfrm>
+            <a:prstGeom prst="rect">
+              <a:avLst/>
+            </a:prstGeom>
+            <a:solidFill>
+              <a:srgbClr val="FFFFFF"/>
+            </a:solidFill>
+            <a:ln w="25400" cap="flat">
+              <a:solidFill>
+                <a:schemeClr val="accent1"/>
+              </a:solidFill>
+              <a:prstDash val="solid"/>
+              <a:round/>
+            </a:ln>
+            <a:effectLst/>
+          </p:spPr>
+          <p:txBody>
+            <a:bodyPr wrap="square" lIns="0" tIns="0" rIns="0" bIns="0" numCol="1" anchor="t">
+              <a:noAutofit/>
+            </a:bodyPr>
+            <a:lstStyle/>
+            <a:p>
+              <a:pPr>
+                <a:defRPr>
+                  <a:solidFill>
+                    <a:schemeClr val="accent3">
+                      <a:lumOff val="-9098"/>
+                    </a:schemeClr>
+                  </a:solidFill>
+                </a:defRPr>
+              </a:pPr>
+            </a:p>
+          </p:txBody>
+        </p:sp>
+        <p:sp>
+          <p:nvSpPr>
+            <p:cNvPr id="247" name="wrapping up!…"/>
+            <p:cNvSpPr txBox="1"/>
+            <p:nvPr/>
+          </p:nvSpPr>
+          <p:spPr>
+            <a:xfrm>
+              <a:off x="12699" y="12699"/>
+              <a:ext cx="6509795" cy="785206"/>
+            </a:xfrm>
+            <a:prstGeom prst="rect">
+              <a:avLst/>
+            </a:prstGeom>
+            <a:noFill/>
+            <a:ln w="12700" cap="flat">
+              <a:noFill/>
+              <a:miter lim="400000"/>
+            </a:ln>
+            <a:effectLst/>
+            <a:extLst>
+              <a:ext uri="{C572A759-6A51-4108-AA02-DFA0A04FC94B}">
+                <ma14:wrappingTextBoxFlag xmlns:ma14="http://schemas.microsoft.com/office/mac/drawingml/2011/main" val="1"/>
+              </a:ext>
+            </a:extLst>
+          </p:spPr>
+          <p:txBody>
+            <a:bodyPr wrap="square" lIns="91422" tIns="91422" rIns="91422" bIns="91422" numCol="1" anchor="t">
+              <a:normAutofit fontScale="100000" lnSpcReduction="0"/>
+            </a:bodyPr>
+            <a:lstStyle/>
+            <a:p>
+              <a:pPr>
+                <a:defRPr sz="2400">
+                  <a:latin typeface="+mn-lt"/>
+                  <a:ea typeface="+mn-ea"/>
+                  <a:cs typeface="+mn-cs"/>
+                  <a:sym typeface="Arial"/>
+                </a:defRPr>
+              </a:pPr>
+              <a:r>
+                <a:t>wrapping up!</a:t>
+              </a:r>
+            </a:p>
+            <a:p>
+              <a:pPr>
+                <a:defRPr>
+                  <a:solidFill>
+                    <a:schemeClr val="accent5"/>
+                  </a:solidFill>
+                </a:defRPr>
+              </a:pPr>
+              <a:r>
+                <a:rPr>
+                  <a:solidFill>
+                    <a:schemeClr val="accent1"/>
+                  </a:solidFill>
+                </a:rPr>
+                <a:t>read the directions below!</a:t>
+              </a:r>
+            </a:p>
+          </p:txBody>
+        </p:sp>
+      </p:grpSp>
+      <p:pic>
+        <p:nvPicPr>
+          <p:cNvPr id="249" name="Image" descr="Image"/>
+          <p:cNvPicPr>
+            <a:picLocks noChangeAspect="1"/>
+          </p:cNvPicPr>
+          <p:nvPr/>
+        </p:nvPicPr>
+        <p:blipFill>
+          <a:blip r:embed="rId2">
+            <a:extLst/>
+          </a:blip>
+          <a:stretch>
+            <a:fillRect/>
+          </a:stretch>
+        </p:blipFill>
+        <p:spPr>
+          <a:xfrm>
+            <a:off x="258907" y="1666158"/>
+            <a:ext cx="2126173" cy="1811184"/>
+          </a:xfrm>
+          <a:prstGeom prst="rect">
+            <a:avLst/>
+          </a:prstGeom>
+          <a:ln w="12700">
+            <a:miter lim="400000"/>
+          </a:ln>
+        </p:spPr>
+      </p:pic>
+      <p:sp>
+        <p:nvSpPr>
+          <p:cNvPr id="250" name="be sure to:"/>
+          <p:cNvSpPr txBox="1"/>
+          <p:nvPr/>
+        </p:nvSpPr>
+        <p:spPr>
+          <a:xfrm>
+            <a:off x="3767070" y="1406013"/>
+            <a:ext cx="1283446" cy="304801"/>
+          </a:xfrm>
+          <a:prstGeom prst="rect">
+            <a:avLst/>
+          </a:prstGeom>
+          <a:ln w="12700">
+            <a:miter lim="400000"/>
+          </a:ln>
+          <a:extLst>
+            <a:ext uri="{C572A759-6A51-4108-AA02-DFA0A04FC94B}">
+              <ma14:wrappingTextBoxFlag xmlns:ma14="http://schemas.microsoft.com/office/mac/drawingml/2011/main" val="1"/>
+            </a:ext>
+          </a:extLst>
+        </p:spPr>
+        <p:txBody>
+          <a:bodyPr wrap="none" lIns="0" tIns="0" rIns="0" bIns="0">
+            <a:spAutoFit/>
+          </a:bodyPr>
+          <a:lstStyle/>
+          <a:p>
+            <a:pPr>
+              <a:defRPr sz="2000">
+                <a:solidFill>
+                  <a:schemeClr val="accent5"/>
+                </a:solidFill>
+              </a:defRPr>
+            </a:pPr>
+            <a:r>
+              <a:t>be sure to:</a:t>
+            </a:r>
+            <a:r>
+              <a:rPr>
+                <a:solidFill>
+                  <a:schemeClr val="accent5">
+                    <a:lumOff val="-9843"/>
+                  </a:schemeClr>
+                </a:solidFill>
+              </a:rPr>
+              <a:t> </a:t>
+            </a:r>
+          </a:p>
+        </p:txBody>
+      </p:sp>
+    </p:spTree>
+  </p:cSld>
+  <p:clrMapOvr>
+    <a:masterClrMapping/>
+  </p:clrMapOvr>
+  <p:transition xmlns:p14="http://schemas.microsoft.com/office/powerpoint/2010/main" spd="med" advClick="1"/>
+</p:sld>
+</file>
+
 <file path=ppt/slides/slide2.xml><?xml version="1.0" encoding="utf-8"?>
 <p:sld xmlns:a="http://schemas.openxmlformats.org/drawingml/2006/main" xmlns:r="http://schemas.openxmlformats.org/officeDocument/2006/relationships" xmlns:p="http://schemas.openxmlformats.org/presentationml/2006/main" xmlns:m="http://schemas.openxmlformats.org/officeDocument/2006/math" xmlns:a14="http://schemas.microsoft.com/office/drawing/2010/main" showMasterSp="1" showMasterPhAnim="1">
   <p:cSld>

</xml_diff>